<commit_message>
Python: Slide Unit 1 (reformatted)
</commit_message>
<xml_diff>
--- a/Data Science resources/Programming in Python/Slides/Slide Unit 1/Basic arithmetic operations in Python.pptx
+++ b/Data Science resources/Programming in Python/Slides/Slide Unit 1/Basic arithmetic operations in Python.pptx
@@ -13,7 +13,7 @@
   </p:handoutMasterIdLst>
   <p:sldIdLst>
     <p:sldId id="256" r:id="rId6"/>
-    <p:sldId id="693" r:id="rId7"/>
+    <p:sldId id="706" r:id="rId7"/>
     <p:sldId id="657" r:id="rId8"/>
     <p:sldId id="704" r:id="rId9"/>
     <p:sldId id="705" r:id="rId10"/>
@@ -122,7 +122,7 @@
         <p14:section name="Default Section" id="{06CDF7AC-AF6E-4614-B140-2231D9F8B510}">
           <p14:sldIdLst>
             <p14:sldId id="256"/>
-            <p14:sldId id="693"/>
+            <p14:sldId id="706"/>
             <p14:sldId id="657"/>
             <p14:sldId id="704"/>
             <p14:sldId id="705"/>
@@ -247,7 +247,7 @@
           <a:p>
             <a:fld id="{E4DABB7E-5FD5-4FD4-8200-24B5A1924914}" type="datetimeFigureOut">
               <a:rPr lang="en-US" smtClean="0"/>
-              <a:t>13-May-21</a:t>
+              <a:t>03-May-24</a:t>
             </a:fld>
             <a:endParaRPr lang="en-US"/>
           </a:p>
@@ -424,7 +424,7 @@
           <a:p>
             <a:fld id="{9BDC6C4C-B340-4EE6-8690-61E4F94D1E11}" type="datetimeFigureOut">
               <a:rPr lang="en-US" smtClean="0"/>
-              <a:t>13-May-21</a:t>
+              <a:t>03-May-24</a:t>
             </a:fld>
             <a:endParaRPr lang="en-US"/>
           </a:p>
@@ -1348,7 +1348,7 @@
           <a:graphicData uri="http://schemas.openxmlformats.org/presentationml/2006/ole">
             <mc:AlternateContent xmlns:mc="http://schemas.openxmlformats.org/markup-compatibility/2006">
               <mc:Choice xmlns:v="urn:schemas-microsoft-com:vml" Requires="v">
-                <p:oleObj spid="_x0000_s2098" name="think-cell Slide" r:id="rId4" imgW="425" imgH="426" progId="TCLayout.ActiveDocument.1">
+                <p:oleObj spid="_x0000_s2099" name="think-cell Slide" r:id="rId4" imgW="425" imgH="426" progId="TCLayout.ActiveDocument.1">
                   <p:embed/>
                 </p:oleObj>
               </mc:Choice>
@@ -2237,6 +2237,230 @@
 </p:sldLayout>
 </file>
 
+<file path=ppt/slideLayouts/slideLayout11.xml><?xml version="1.0" encoding="utf-8"?>
+<p:sldLayout xmlns:a="http://schemas.openxmlformats.org/drawingml/2006/main" xmlns:r="http://schemas.openxmlformats.org/officeDocument/2006/relationships" xmlns:p="http://schemas.openxmlformats.org/presentationml/2006/main" userDrawn="1">
+  <p:cSld name="1_Title Slide">
+    <p:bg>
+      <p:bgPr>
+        <a:solidFill>
+          <a:srgbClr val="F8F9F7"/>
+        </a:solidFill>
+        <a:effectLst/>
+      </p:bgPr>
+    </p:bg>
+    <p:spTree>
+      <p:nvGrpSpPr>
+        <p:cNvPr id="1" name=""/>
+        <p:cNvGrpSpPr/>
+        <p:nvPr/>
+      </p:nvGrpSpPr>
+      <p:grpSpPr>
+        <a:xfrm>
+          <a:off x="0" y="0"/>
+          <a:ext cx="0" cy="0"/>
+          <a:chOff x="0" y="0"/>
+          <a:chExt cx="0" cy="0"/>
+        </a:xfrm>
+      </p:grpSpPr>
+      <p:graphicFrame>
+        <p:nvGraphicFramePr>
+          <p:cNvPr id="4" name="Object 3" hidden="1"/>
+          <p:cNvGraphicFramePr>
+            <a:graphicFrameLocks noChangeAspect="1"/>
+          </p:cNvGraphicFramePr>
+          <p:nvPr userDrawn="1">
+            <p:custDataLst>
+              <p:tags r:id="rId2"/>
+            </p:custDataLst>
+          </p:nvPr>
+        </p:nvGraphicFramePr>
+        <p:xfrm>
+          <a:off x="1588" y="1588"/>
+          <a:ext cx="1587" cy="1587"/>
+        </p:xfrm>
+        <a:graphic>
+          <a:graphicData uri="http://schemas.openxmlformats.org/presentationml/2006/ole">
+            <mc:AlternateContent xmlns:mc="http://schemas.openxmlformats.org/markup-compatibility/2006">
+              <mc:Choice xmlns:v="urn:schemas-microsoft-com:vml" Requires="v">
+                <p:oleObj spid="_x0000_s12290" name="think-cell Slide" r:id="rId4" imgW="425" imgH="426" progId="TCLayout.ActiveDocument.1">
+                  <p:embed/>
+                </p:oleObj>
+              </mc:Choice>
+              <mc:Fallback>
+                <p:oleObj name="think-cell Slide" r:id="rId4" imgW="425" imgH="426" progId="TCLayout.ActiveDocument.1">
+                  <p:embed/>
+                  <p:pic>
+                    <p:nvPicPr>
+                      <p:cNvPr id="4" name="Object 3" hidden="1"/>
+                      <p:cNvPicPr/>
+                      <p:nvPr/>
+                    </p:nvPicPr>
+                    <p:blipFill>
+                      <a:blip r:embed="rId5"/>
+                      <a:stretch>
+                        <a:fillRect/>
+                      </a:stretch>
+                    </p:blipFill>
+                    <p:spPr>
+                      <a:xfrm>
+                        <a:off x="1588" y="1588"/>
+                        <a:ext cx="1587" cy="1587"/>
+                      </a:xfrm>
+                      <a:prstGeom prst="rect">
+                        <a:avLst/>
+                      </a:prstGeom>
+                    </p:spPr>
+                  </p:pic>
+                </p:oleObj>
+              </mc:Fallback>
+            </mc:AlternateContent>
+          </a:graphicData>
+        </a:graphic>
+      </p:graphicFrame>
+      <p:sp>
+        <p:nvSpPr>
+          <p:cNvPr id="11" name="Rectangle 10">
+            <a:extLst>
+              <a:ext uri="{FF2B5EF4-FFF2-40B4-BE49-F238E27FC236}">
+                <a16:creationId xmlns:a16="http://schemas.microsoft.com/office/drawing/2014/main" id="{123D8E40-FDBE-46A0-9A0B-123E9AA3D356}"/>
+              </a:ext>
+            </a:extLst>
+          </p:cNvPr>
+          <p:cNvSpPr/>
+          <p:nvPr userDrawn="1"/>
+        </p:nvSpPr>
+        <p:spPr>
+          <a:xfrm>
+            <a:off x="0" y="5029200"/>
+            <a:ext cx="12192000" cy="1828800"/>
+          </a:xfrm>
+          <a:prstGeom prst="rect">
+            <a:avLst/>
+          </a:prstGeom>
+          <a:solidFill>
+            <a:schemeClr val="bg1"/>
+          </a:solidFill>
+          <a:ln>
+            <a:noFill/>
+          </a:ln>
+        </p:spPr>
+        <p:style>
+          <a:lnRef idx="2">
+            <a:schemeClr val="accent1">
+              <a:shade val="50000"/>
+            </a:schemeClr>
+          </a:lnRef>
+          <a:fillRef idx="1">
+            <a:schemeClr val="accent1"/>
+          </a:fillRef>
+          <a:effectRef idx="0">
+            <a:schemeClr val="accent1"/>
+          </a:effectRef>
+          <a:fontRef idx="minor">
+            <a:schemeClr val="lt1"/>
+          </a:fontRef>
+        </p:style>
+        <p:txBody>
+          <a:bodyPr rtlCol="0" anchor="ctr"/>
+          <a:lstStyle/>
+          <a:p>
+            <a:pPr algn="ctr"/>
+            <a:endParaRPr lang="en-US"/>
+          </a:p>
+        </p:txBody>
+      </p:sp>
+      <p:pic>
+        <p:nvPicPr>
+          <p:cNvPr id="5" name="Picture 4" descr="A poster for a college&#10;&#10;Description automatically generated">
+            <a:extLst>
+              <a:ext uri="{FF2B5EF4-FFF2-40B4-BE49-F238E27FC236}">
+                <a16:creationId xmlns:a16="http://schemas.microsoft.com/office/drawing/2014/main" id="{29A2E576-C552-1E05-946F-15D2B14C6940}"/>
+              </a:ext>
+            </a:extLst>
+          </p:cNvPr>
+          <p:cNvPicPr>
+            <a:picLocks noChangeAspect="1"/>
+          </p:cNvPicPr>
+          <p:nvPr userDrawn="1"/>
+        </p:nvPicPr>
+        <p:blipFill>
+          <a:blip r:embed="rId6" cstate="print">
+            <a:extLst>
+              <a:ext uri="{28A0092B-C50C-407E-A947-70E740481C1C}">
+                <a14:useLocalDpi xmlns:a14="http://schemas.microsoft.com/office/drawing/2010/main" val="0"/>
+              </a:ext>
+            </a:extLst>
+          </a:blip>
+          <a:stretch>
+            <a:fillRect/>
+          </a:stretch>
+        </p:blipFill>
+        <p:spPr>
+          <a:xfrm>
+            <a:off x="0" y="277404"/>
+            <a:ext cx="5994015" cy="5994015"/>
+          </a:xfrm>
+          <a:prstGeom prst="rect">
+            <a:avLst/>
+          </a:prstGeom>
+        </p:spPr>
+      </p:pic>
+      <p:sp>
+        <p:nvSpPr>
+          <p:cNvPr id="6" name="Title 1">
+            <a:extLst>
+              <a:ext uri="{FF2B5EF4-FFF2-40B4-BE49-F238E27FC236}">
+                <a16:creationId xmlns:a16="http://schemas.microsoft.com/office/drawing/2014/main" id="{FA3F47FF-6C14-775D-751A-FCFE2F9CBB22}"/>
+              </a:ext>
+            </a:extLst>
+          </p:cNvPr>
+          <p:cNvSpPr>
+            <a:spLocks noGrp="1"/>
+          </p:cNvSpPr>
+          <p:nvPr>
+            <p:ph type="ctrTitle"/>
+          </p:nvPr>
+        </p:nvSpPr>
+        <p:spPr>
+          <a:xfrm>
+            <a:off x="6290643" y="3024341"/>
+            <a:ext cx="5469521" cy="500137"/>
+          </a:xfrm>
+        </p:spPr>
+        <p:txBody>
+          <a:bodyPr wrap="square" lIns="15240" tIns="7620" rIns="15240" bIns="7620" anchor="b">
+            <a:spAutoFit/>
+          </a:bodyPr>
+          <a:lstStyle>
+            <a:lvl1pPr algn="ctr">
+              <a:defRPr sz="3500" b="1">
+                <a:solidFill>
+                  <a:schemeClr val="accent1"/>
+                </a:solidFill>
+              </a:defRPr>
+            </a:lvl1pPr>
+          </a:lstStyle>
+          <a:p>
+            <a:r>
+              <a:rPr lang="en-US" dirty="0"/>
+              <a:t>Click to edit Master title style</a:t>
+            </a:r>
+          </a:p>
+        </p:txBody>
+      </p:sp>
+    </p:spTree>
+    <p:extLst>
+      <p:ext uri="{BB962C8B-B14F-4D97-AF65-F5344CB8AC3E}">
+        <p14:creationId xmlns:p14="http://schemas.microsoft.com/office/powerpoint/2010/main" val="634196781"/>
+      </p:ext>
+    </p:extLst>
+  </p:cSld>
+  <p:clrMapOvr>
+    <a:masterClrMapping/>
+  </p:clrMapOvr>
+</p:sldLayout>
+</file>
+
 <file path=ppt/slideLayouts/slideLayout2.xml><?xml version="1.0" encoding="utf-8"?>
 <p:sldLayout xmlns:a="http://schemas.openxmlformats.org/drawingml/2006/main" xmlns:r="http://schemas.openxmlformats.org/officeDocument/2006/relationships" xmlns:p="http://schemas.openxmlformats.org/presentationml/2006/main" preserve="1" userDrawn="1">
   <p:cSld name="6_Title Slide">
@@ -2268,7 +2492,7 @@
         </p:nvSpPr>
         <p:spPr>
           <a:xfrm>
-            <a:off x="0" y="-6"/>
+            <a:off x="0" y="0"/>
             <a:ext cx="12191996" cy="6858005"/>
           </a:xfrm>
           <a:prstGeom prst="rect">
@@ -2308,10 +2532,10 @@
       </p:sp>
       <p:sp>
         <p:nvSpPr>
-          <p:cNvPr id="38" name="Arrow: Pentagon 37">
+          <p:cNvPr id="13" name="Arrow: Pentagon 12">
             <a:extLst>
               <a:ext uri="{FF2B5EF4-FFF2-40B4-BE49-F238E27FC236}">
-                <a16:creationId xmlns:a16="http://schemas.microsoft.com/office/drawing/2014/main" id="{9787AEAF-CECE-47AD-BC55-6A8FA3B19CEE}"/>
+                <a16:creationId xmlns:a16="http://schemas.microsoft.com/office/drawing/2014/main" id="{C8308EFB-9DD4-4A76-AE7B-514DAB239435}"/>
               </a:ext>
             </a:extLst>
           </p:cNvPr>
@@ -2320,8 +2544,8 @@
         </p:nvSpPr>
         <p:spPr>
           <a:xfrm flipH="1">
-            <a:off x="5511800" y="-6"/>
-            <a:ext cx="6680196" cy="6877110"/>
+            <a:off x="5501527" y="734701"/>
+            <a:ext cx="6680196" cy="5270643"/>
           </a:xfrm>
           <a:prstGeom prst="homePlate">
             <a:avLst>
@@ -2367,216 +2591,12 @@
           </a:p>
         </p:txBody>
       </p:sp>
-      <p:sp>
-        <p:nvSpPr>
-          <p:cNvPr id="6" name="TextBox 5">
+      <p:pic>
+        <p:nvPicPr>
+          <p:cNvPr id="14" name="Picture 13" descr="A logo with text on it&#10;&#10;Description automatically generated">
             <a:extLst>
               <a:ext uri="{FF2B5EF4-FFF2-40B4-BE49-F238E27FC236}">
-                <a16:creationId xmlns:a16="http://schemas.microsoft.com/office/drawing/2014/main" id="{52E4E2B9-ADBD-40B7-BB28-46FFE040B61C}"/>
-              </a:ext>
-            </a:extLst>
-          </p:cNvPr>
-          <p:cNvSpPr txBox="1"/>
-          <p:nvPr userDrawn="1"/>
-        </p:nvSpPr>
-        <p:spPr>
-          <a:xfrm flipH="1">
-            <a:off x="5820012" y="3184575"/>
-            <a:ext cx="1390988" cy="584775"/>
-          </a:xfrm>
-          <a:prstGeom prst="rect">
-            <a:avLst/>
-          </a:prstGeom>
-          <a:noFill/>
-        </p:spPr>
-        <p:txBody>
-          <a:bodyPr wrap="square" rtlCol="0">
-            <a:spAutoFit/>
-          </a:bodyPr>
-          <a:lstStyle/>
-          <a:p>
-            <a:r>
-              <a:rPr lang="en-US" sz="1600" b="1" dirty="0">
-                <a:solidFill>
-                  <a:schemeClr val="tx1"/>
-                </a:solidFill>
-                <a:latin typeface="+mj-lt"/>
-                <a:cs typeface="Aharoni" panose="02010803020104030203" pitchFamily="2" charset="-79"/>
-              </a:rPr>
-              <a:t>Partnering</a:t>
-            </a:r>
-            <a:br>
-              <a:rPr lang="en-US" sz="1600" b="1" dirty="0">
-                <a:solidFill>
-                  <a:schemeClr val="tx1"/>
-                </a:solidFill>
-                <a:latin typeface="+mj-lt"/>
-                <a:cs typeface="Aharoni" panose="02010803020104030203" pitchFamily="2" charset="-79"/>
-              </a:rPr>
-            </a:br>
-            <a:r>
-              <a:rPr lang="en-US" sz="1600" b="1" dirty="0">
-                <a:solidFill>
-                  <a:schemeClr val="tx1"/>
-                </a:solidFill>
-                <a:latin typeface="+mj-lt"/>
-                <a:cs typeface="Aharoni" panose="02010803020104030203" pitchFamily="2" charset="-79"/>
-              </a:rPr>
-              <a:t>Institutions</a:t>
-            </a:r>
-            <a:endParaRPr lang="en-US" sz="500" b="1" dirty="0">
-              <a:solidFill>
-                <a:schemeClr val="tx1"/>
-              </a:solidFill>
-              <a:latin typeface="+mj-lt"/>
-              <a:cs typeface="Aharoni" panose="02010803020104030203" pitchFamily="2" charset="-79"/>
-            </a:endParaRPr>
-          </a:p>
-        </p:txBody>
-      </p:sp>
-      <p:grpSp>
-        <p:nvGrpSpPr>
-          <p:cNvPr id="26" name="Group 25">
-            <a:extLst>
-              <a:ext uri="{FF2B5EF4-FFF2-40B4-BE49-F238E27FC236}">
-                <a16:creationId xmlns:a16="http://schemas.microsoft.com/office/drawing/2014/main" id="{20CB8E11-39A4-4E1E-A579-F3F237CFBB48}"/>
-              </a:ext>
-            </a:extLst>
-          </p:cNvPr>
-          <p:cNvGrpSpPr/>
-          <p:nvPr userDrawn="1"/>
-        </p:nvGrpSpPr>
-        <p:grpSpPr>
-          <a:xfrm>
-            <a:off x="7211001" y="0"/>
-            <a:ext cx="4980999" cy="6872041"/>
-            <a:chOff x="7210999" y="-376519"/>
-            <a:chExt cx="4981000" cy="6816521"/>
-          </a:xfrm>
-        </p:grpSpPr>
-        <p:grpSp>
-          <p:nvGrpSpPr>
-            <p:cNvPr id="22" name="Group 21">
-              <a:extLst>
-                <a:ext uri="{FF2B5EF4-FFF2-40B4-BE49-F238E27FC236}">
-                  <a16:creationId xmlns:a16="http://schemas.microsoft.com/office/drawing/2014/main" id="{553FEB1D-953F-4AD5-979E-64A2E1BFFAA3}"/>
-                </a:ext>
-              </a:extLst>
-            </p:cNvPr>
-            <p:cNvGrpSpPr/>
-            <p:nvPr userDrawn="1"/>
-          </p:nvGrpSpPr>
-          <p:grpSpPr>
-            <a:xfrm>
-              <a:off x="7210999" y="-376519"/>
-              <a:ext cx="4981000" cy="6242350"/>
-              <a:chOff x="7210999" y="-19320"/>
-              <a:chExt cx="4981000" cy="6242350"/>
-            </a:xfrm>
-          </p:grpSpPr>
-          <p:pic>
-            <p:nvPicPr>
-              <p:cNvPr id="9" name="Picture 8">
-                <a:extLst>
-                  <a:ext uri="{FF2B5EF4-FFF2-40B4-BE49-F238E27FC236}">
-                    <a16:creationId xmlns:a16="http://schemas.microsoft.com/office/drawing/2014/main" id="{B8A9B711-267A-4825-AFA4-306D33323A56}"/>
-                  </a:ext>
-                </a:extLst>
-              </p:cNvPr>
-              <p:cNvPicPr/>
-              <p:nvPr/>
-            </p:nvPicPr>
-            <p:blipFill rotWithShape="1">
-              <a:blip r:embed="rId2">
-                <a:extLst>
-                  <a:ext uri="{28A0092B-C50C-407E-A947-70E740481C1C}">
-                    <a14:useLocalDpi xmlns:a14="http://schemas.microsoft.com/office/drawing/2010/main" val="0"/>
-                  </a:ext>
-                </a:extLst>
-              </a:blip>
-              <a:srcRect b="3956"/>
-              <a:stretch/>
-            </p:blipFill>
-            <p:spPr bwMode="auto">
-              <a:xfrm>
-                <a:off x="7211001" y="1204009"/>
-                <a:ext cx="4980990" cy="5019021"/>
-              </a:xfrm>
-              <a:prstGeom prst="rect">
-                <a:avLst/>
-              </a:prstGeom>
-              <a:noFill/>
-              <a:ln>
-                <a:noFill/>
-              </a:ln>
-            </p:spPr>
-          </p:pic>
-          <p:pic>
-            <p:nvPicPr>
-              <p:cNvPr id="12" name="Picture 11">
-                <a:extLst>
-                  <a:ext uri="{FF2B5EF4-FFF2-40B4-BE49-F238E27FC236}">
-                    <a16:creationId xmlns:a16="http://schemas.microsoft.com/office/drawing/2014/main" id="{FDAB62FA-DA2E-47A7-B719-956966448716}"/>
-                  </a:ext>
-                </a:extLst>
-              </p:cNvPr>
-              <p:cNvPicPr>
-                <a:picLocks noChangeAspect="1"/>
-              </p:cNvPicPr>
-              <p:nvPr userDrawn="1"/>
-            </p:nvPicPr>
-            <p:blipFill rotWithShape="1">
-              <a:blip r:embed="rId3"/>
-              <a:srcRect t="8596" b="17335"/>
-              <a:stretch/>
-            </p:blipFill>
-            <p:spPr>
-              <a:xfrm>
-                <a:off x="7210999" y="-19320"/>
-                <a:ext cx="4981000" cy="1223329"/>
-              </a:xfrm>
-              <a:prstGeom prst="rect">
-                <a:avLst/>
-              </a:prstGeom>
-            </p:spPr>
-          </p:pic>
-        </p:grpSp>
-        <p:pic>
-          <p:nvPicPr>
-            <p:cNvPr id="24" name="Picture 23">
-              <a:extLst>
-                <a:ext uri="{FF2B5EF4-FFF2-40B4-BE49-F238E27FC236}">
-                  <a16:creationId xmlns:a16="http://schemas.microsoft.com/office/drawing/2014/main" id="{9B7456BD-03D3-41B8-957B-38CB1512A39A}"/>
-                </a:ext>
-              </a:extLst>
-            </p:cNvPr>
-            <p:cNvPicPr>
-              <a:picLocks noChangeAspect="1"/>
-            </p:cNvPicPr>
-            <p:nvPr userDrawn="1"/>
-          </p:nvPicPr>
-          <p:blipFill rotWithShape="1">
-            <a:blip r:embed="rId4"/>
-            <a:srcRect l="92684" t="16179" b="22966"/>
-            <a:stretch/>
-          </p:blipFill>
-          <p:spPr>
-            <a:xfrm>
-              <a:off x="11818960" y="5850942"/>
-              <a:ext cx="364397" cy="589060"/>
-            </a:xfrm>
-            <a:prstGeom prst="rect">
-              <a:avLst/>
-            </a:prstGeom>
-          </p:spPr>
-        </p:pic>
-      </p:grpSp>
-      <p:pic>
-        <p:nvPicPr>
-          <p:cNvPr id="7" name="Picture 6">
-            <a:extLst>
-              <a:ext uri="{FF2B5EF4-FFF2-40B4-BE49-F238E27FC236}">
-                <a16:creationId xmlns:a16="http://schemas.microsoft.com/office/drawing/2014/main" id="{257237D6-3BC4-49E6-A079-9EF58A6B17EA}"/>
+                <a16:creationId xmlns:a16="http://schemas.microsoft.com/office/drawing/2014/main" id="{6DAE0E42-06F0-49FC-A998-4E2DBEF8F0E8}"/>
               </a:ext>
             </a:extLst>
           </p:cNvPr>
@@ -2585,15 +2605,22 @@
           </p:cNvPicPr>
           <p:nvPr userDrawn="1"/>
         </p:nvPicPr>
-        <p:blipFill rotWithShape="1">
-          <a:blip r:embed="rId5"/>
-          <a:srcRect t="29710" b="25953"/>
-          <a:stretch/>
+        <p:blipFill>
+          <a:blip r:embed="rId2">
+            <a:extLst>
+              <a:ext uri="{28A0092B-C50C-407E-A947-70E740481C1C}">
+                <a14:useLocalDpi xmlns:a14="http://schemas.microsoft.com/office/drawing/2010/main" val="0"/>
+              </a:ext>
+            </a:extLst>
+          </a:blip>
+          <a:stretch>
+            <a:fillRect/>
+          </a:stretch>
         </p:blipFill>
         <p:spPr>
           <a:xfrm>
-            <a:off x="7210999" y="6276829"/>
-            <a:ext cx="4727891" cy="598922"/>
+            <a:off x="7576762" y="2617384"/>
+            <a:ext cx="3429000" cy="1304925"/>
           </a:xfrm>
           <a:prstGeom prst="rect">
             <a:avLst/>
@@ -2656,7 +2683,7 @@
           <a:graphicData uri="http://schemas.openxmlformats.org/presentationml/2006/ole">
             <mc:AlternateContent xmlns:mc="http://schemas.openxmlformats.org/markup-compatibility/2006">
               <mc:Choice xmlns:v="urn:schemas-microsoft-com:vml" Requires="v">
-                <p:oleObj spid="_x0000_s4146" name="think-cell Slide" r:id="rId4" imgW="347" imgH="348" progId="TCLayout.ActiveDocument.1">
+                <p:oleObj spid="_x0000_s4147" name="think-cell Slide" r:id="rId4" imgW="347" imgH="348" progId="TCLayout.ActiveDocument.1">
                   <p:embed/>
                 </p:oleObj>
               </mc:Choice>
@@ -2803,7 +2830,7 @@
           <a:p>
             <a:fld id="{C426BC5F-09C1-43F9-92E4-3807667E7453}" type="datetimeFigureOut">
               <a:rPr lang="en-US" smtClean="0"/>
-              <a:t>13-May-21</a:t>
+              <a:t>03-May-24</a:t>
             </a:fld>
             <a:endParaRPr lang="en-US" dirty="0"/>
           </a:p>
@@ -4094,7 +4121,7 @@
           <a:graphicData uri="http://schemas.openxmlformats.org/presentationml/2006/ole">
             <mc:AlternateContent xmlns:mc="http://schemas.openxmlformats.org/markup-compatibility/2006">
               <mc:Choice xmlns:v="urn:schemas-microsoft-com:vml" Requires="v">
-                <p:oleObj spid="_x0000_s7218" name="think-cell Slide" r:id="rId4" imgW="347" imgH="348" progId="TCLayout.ActiveDocument.1">
+                <p:oleObj spid="_x0000_s7219" name="think-cell Slide" r:id="rId4" imgW="347" imgH="348" progId="TCLayout.ActiveDocument.1">
                   <p:embed/>
                 </p:oleObj>
               </mc:Choice>
@@ -4175,7 +4202,7 @@
           <a:p>
             <a:fld id="{92F64031-640B-4962-8CF9-EAD8AB4A604D}" type="datetimeFigureOut">
               <a:rPr lang="en-GB" smtClean="0"/>
-              <a:t>13/05/2021</a:t>
+              <a:t>03/05/2024</a:t>
             </a:fld>
             <a:endParaRPr lang="en-GB"/>
           </a:p>
@@ -4286,7 +4313,7 @@
           <a:graphicData uri="http://schemas.openxmlformats.org/presentationml/2006/ole">
             <mc:AlternateContent xmlns:mc="http://schemas.openxmlformats.org/markup-compatibility/2006">
               <mc:Choice xmlns:v="urn:schemas-microsoft-com:vml" Requires="v">
-                <p:oleObj spid="_x0000_s9266" name="think-cell Slide" r:id="rId4" imgW="425" imgH="426" progId="TCLayout.ActiveDocument.1">
+                <p:oleObj spid="_x0000_s9267" name="think-cell Slide" r:id="rId4" imgW="425" imgH="426" progId="TCLayout.ActiveDocument.1">
                   <p:embed/>
                 </p:oleObj>
               </mc:Choice>
@@ -4513,7 +4540,7 @@
         </p:blipFill>
         <p:spPr>
           <a:xfrm>
-            <a:off x="48126" y="808613"/>
+            <a:off x="0" y="808613"/>
             <a:ext cx="11998993" cy="5240774"/>
           </a:xfrm>
           <a:prstGeom prst="rect">
@@ -4753,7 +4780,7 @@
           <a:graphicData uri="http://schemas.openxmlformats.org/presentationml/2006/ole">
             <mc:AlternateContent xmlns:mc="http://schemas.openxmlformats.org/markup-compatibility/2006">
               <mc:Choice xmlns:v="urn:schemas-microsoft-com:vml" Requires="v">
-                <p:oleObj spid="_x0000_s11314" name="think-cell Slide" r:id="rId4" imgW="347" imgH="348" progId="TCLayout.ActiveDocument.1">
+                <p:oleObj spid="_x0000_s11315" name="think-cell Slide" r:id="rId4" imgW="347" imgH="348" progId="TCLayout.ActiveDocument.1">
                   <p:embed/>
                 </p:oleObj>
               </mc:Choice>
@@ -4900,7 +4927,7 @@
           <a:p>
             <a:fld id="{C426BC5F-09C1-43F9-92E4-3807667E7453}" type="datetimeFigureOut">
               <a:rPr lang="en-US" smtClean="0"/>
-              <a:t>13-May-21</a:t>
+              <a:t>03-May-24</a:t>
             </a:fld>
             <a:endParaRPr lang="en-US"/>
           </a:p>
@@ -4986,7 +5013,7 @@
           <a:graphicData uri="http://schemas.openxmlformats.org/presentationml/2006/ole">
             <mc:AlternateContent xmlns:mc="http://schemas.openxmlformats.org/markup-compatibility/2006">
               <mc:Choice xmlns:v="urn:schemas-microsoft-com:vml" Requires="v">
-                <p:oleObj spid="_x0000_s1074" name="think-cell Slide" r:id="rId10" imgW="425" imgH="426" progId="TCLayout.ActiveDocument.1">
+                <p:oleObj spid="_x0000_s1075" name="think-cell Slide" r:id="rId10" imgW="425" imgH="426" progId="TCLayout.ActiveDocument.1">
                   <p:embed/>
                 </p:oleObj>
               </mc:Choice>
@@ -5515,40 +5542,6 @@
           </a:p>
         </p:txBody>
       </p:sp>
-      <p:pic>
-        <p:nvPicPr>
-          <p:cNvPr id="13" name="Picture 12">
-            <a:extLst>
-              <a:ext uri="{FF2B5EF4-FFF2-40B4-BE49-F238E27FC236}">
-                <a16:creationId xmlns:a16="http://schemas.microsoft.com/office/drawing/2014/main" id="{23304A6A-D15B-47E1-B072-1C47E2C76553}"/>
-              </a:ext>
-            </a:extLst>
-          </p:cNvPr>
-          <p:cNvPicPr/>
-          <p:nvPr userDrawn="1"/>
-        </p:nvPicPr>
-        <p:blipFill>
-          <a:blip r:embed="rId12" cstate="print">
-            <a:extLst>
-              <a:ext uri="{28A0092B-C50C-407E-A947-70E740481C1C}">
-                <a14:useLocalDpi xmlns:a14="http://schemas.microsoft.com/office/drawing/2010/main" val="0"/>
-              </a:ext>
-            </a:extLst>
-          </a:blip>
-          <a:stretch>
-            <a:fillRect/>
-          </a:stretch>
-        </p:blipFill>
-        <p:spPr>
-          <a:xfrm>
-            <a:off x="10755433" y="31710"/>
-            <a:ext cx="1428750" cy="596265"/>
-          </a:xfrm>
-          <a:prstGeom prst="rect">
-            <a:avLst/>
-          </a:prstGeom>
-        </p:spPr>
-      </p:pic>
     </p:spTree>
     <p:extLst>
       <p:ext uri="{BB962C8B-B14F-4D97-AF65-F5344CB8AC3E}">
@@ -5893,7 +5886,7 @@
           </p:cNvGraphicFramePr>
           <p:nvPr userDrawn="1">
             <p:custDataLst>
-              <p:tags r:id="rId7"/>
+              <p:tags r:id="rId8"/>
             </p:custDataLst>
           </p:nvPr>
         </p:nvGraphicFramePr>
@@ -5905,12 +5898,12 @@
           <a:graphicData uri="http://schemas.openxmlformats.org/presentationml/2006/ole">
             <mc:AlternateContent xmlns:mc="http://schemas.openxmlformats.org/markup-compatibility/2006">
               <mc:Choice xmlns:v="urn:schemas-microsoft-com:vml" Requires="v">
-                <p:oleObj spid="_x0000_s8242" name="think-cell Slide" r:id="rId9" imgW="425" imgH="426" progId="TCLayout.ActiveDocument.1">
+                <p:oleObj spid="_x0000_s8243" name="think-cell Slide" r:id="rId10" imgW="425" imgH="426" progId="TCLayout.ActiveDocument.1">
                   <p:embed/>
                 </p:oleObj>
               </mc:Choice>
               <mc:Fallback>
-                <p:oleObj name="think-cell Slide" r:id="rId9" imgW="425" imgH="426" progId="TCLayout.ActiveDocument.1">
+                <p:oleObj name="think-cell Slide" r:id="rId10" imgW="425" imgH="426" progId="TCLayout.ActiveDocument.1">
                   <p:embed/>
                   <p:pic>
                     <p:nvPicPr>
@@ -5919,7 +5912,7 @@
                       <p:nvPr/>
                     </p:nvPicPr>
                     <p:blipFill>
-                      <a:blip r:embed="rId10"/>
+                      <a:blip r:embed="rId11"/>
                       <a:stretch>
                         <a:fillRect/>
                       </a:stretch>
@@ -5952,7 +5945,7 @@
           <p:cNvSpPr/>
           <p:nvPr userDrawn="1">
             <p:custDataLst>
-              <p:tags r:id="rId8"/>
+              <p:tags r:id="rId9"/>
             </p:custDataLst>
           </p:nvPr>
         </p:nvSpPr>
@@ -6491,40 +6484,6 @@
           </a:p>
         </p:txBody>
       </p:sp>
-      <p:pic>
-        <p:nvPicPr>
-          <p:cNvPr id="14" name="Picture 13">
-            <a:extLst>
-              <a:ext uri="{FF2B5EF4-FFF2-40B4-BE49-F238E27FC236}">
-                <a16:creationId xmlns:a16="http://schemas.microsoft.com/office/drawing/2014/main" id="{FDFCD0C7-445F-4A14-9C86-5CF981271CEE}"/>
-              </a:ext>
-            </a:extLst>
-          </p:cNvPr>
-          <p:cNvPicPr/>
-          <p:nvPr userDrawn="1"/>
-        </p:nvPicPr>
-        <p:blipFill>
-          <a:blip r:embed="rId11" cstate="print">
-            <a:extLst>
-              <a:ext uri="{28A0092B-C50C-407E-A947-70E740481C1C}">
-                <a14:useLocalDpi xmlns:a14="http://schemas.microsoft.com/office/drawing/2010/main" val="0"/>
-              </a:ext>
-            </a:extLst>
-          </a:blip>
-          <a:stretch>
-            <a:fillRect/>
-          </a:stretch>
-        </p:blipFill>
-        <p:spPr>
-          <a:xfrm>
-            <a:off x="10736027" y="18414"/>
-            <a:ext cx="1428750" cy="596265"/>
-          </a:xfrm>
-          <a:prstGeom prst="rect">
-            <a:avLst/>
-          </a:prstGeom>
-        </p:spPr>
-      </p:pic>
     </p:spTree>
     <p:extLst>
       <p:ext uri="{BB962C8B-B14F-4D97-AF65-F5344CB8AC3E}">
@@ -6538,6 +6497,7 @@
     <p:sldLayoutId id="2147483674" r:id="rId2"/>
     <p:sldLayoutId id="2147483671" r:id="rId3"/>
     <p:sldLayoutId id="2147483673" r:id="rId4"/>
+    <p:sldLayoutId id="2147483675" r:id="rId5"/>
   </p:sldLayoutIdLst>
   <p:txStyles>
     <p:titleStyle>
@@ -7018,7 +6978,13 @@
       </p:grpSpPr>
       <p:sp>
         <p:nvSpPr>
-          <p:cNvPr id="2" name="Title 1"/>
+          <p:cNvPr id="5" name="Title 1">
+            <a:extLst>
+              <a:ext uri="{FF2B5EF4-FFF2-40B4-BE49-F238E27FC236}">
+                <a16:creationId xmlns:a16="http://schemas.microsoft.com/office/drawing/2014/main" id="{9D65FEA3-2E43-4FDA-9957-E8644DC435E2}"/>
+              </a:ext>
+            </a:extLst>
+          </p:cNvPr>
           <p:cNvSpPr>
             <a:spLocks noGrp="1"/>
           </p:cNvSpPr>
@@ -7028,8 +6994,8 @@
         </p:nvSpPr>
         <p:spPr>
           <a:xfrm>
-            <a:off x="66351" y="6219545"/>
-            <a:ext cx="12193443" cy="624786"/>
+            <a:off x="6096000" y="2770286"/>
+            <a:ext cx="5346283" cy="1317427"/>
           </a:xfrm>
         </p:spPr>
         <p:txBody>
@@ -7050,25 +7016,13 @@
     </p:spTree>
     <p:extLst>
       <p:ext uri="{BB962C8B-B14F-4D97-AF65-F5344CB8AC3E}">
-        <p14:creationId xmlns:p14="http://schemas.microsoft.com/office/powerpoint/2010/main" val="3510249180"/>
+        <p14:creationId xmlns:p14="http://schemas.microsoft.com/office/powerpoint/2010/main" val="1805405204"/>
       </p:ext>
     </p:extLst>
   </p:cSld>
   <p:clrMapOvr>
     <a:masterClrMapping/>
   </p:clrMapOvr>
-  <mc:AlternateContent xmlns:mc="http://schemas.openxmlformats.org/markup-compatibility/2006" xmlns:p14="http://schemas.microsoft.com/office/powerpoint/2010/main">
-    <mc:Choice Requires="p14">
-      <p:transition spd="med" p14:dur="700">
-        <p:fade/>
-      </p:transition>
-    </mc:Choice>
-    <mc:Fallback xmlns="">
-      <p:transition spd="med">
-        <p:fade/>
-      </p:transition>
-    </mc:Fallback>
-  </mc:AlternateContent>
 </p:sld>
 </file>
 
@@ -8766,6 +8720,12 @@
 </p:tagLst>
 </file>
 
+<file path=ppt/tags/tag9.xml><?xml version="1.0" encoding="utf-8"?>
+<p:tagLst xmlns:a="http://schemas.openxmlformats.org/drawingml/2006/main" xmlns:r="http://schemas.openxmlformats.org/officeDocument/2006/relationships" xmlns:p="http://schemas.openxmlformats.org/presentationml/2006/main">
+  <p:tag name="THINKCELLSHAPEDONOTDELETE" val="thinkcellActiveDocDoNotDelete"/>
+</p:tagLst>
+</file>
+
 <file path=ppt/theme/theme1.xml><?xml version="1.0" encoding="utf-8"?>
 <a:theme xmlns:a="http://schemas.openxmlformats.org/drawingml/2006/main" name="1_Office Theme">
   <a:themeElements>
@@ -9800,12 +9760,6 @@
 </file>
 
 <file path=customXml/item1.xml><?xml version="1.0" encoding="utf-8"?>
-<p:properties xmlns:p="http://schemas.microsoft.com/office/2006/metadata/properties" xmlns:xsi="http://www.w3.org/2001/XMLSchema-instance" xmlns:pc="http://schemas.microsoft.com/office/infopath/2007/PartnerControls">
-  <documentManagement/>
-</p:properties>
-</file>
-
-<file path=customXml/item2.xml><?xml version="1.0" encoding="utf-8"?>
 <ct:contentTypeSchema xmlns:ct="http://schemas.microsoft.com/office/2006/metadata/contentType" xmlns:ma="http://schemas.microsoft.com/office/2006/metadata/properties/metaAttributes" ct:_="" ma:_="" ma:contentTypeName="Document" ma:contentTypeID="0x010100319A35104FAE2A48B18B518F397B7CA4" ma:contentTypeVersion="11" ma:contentTypeDescription="Create a new document." ma:contentTypeScope="" ma:versionID="818dfa9a4b3d3bceb1a965a71e647ec2">
   <xsd:schema xmlns:xsd="http://www.w3.org/2001/XMLSchema" xmlns:xs="http://www.w3.org/2001/XMLSchema" xmlns:p="http://schemas.microsoft.com/office/2006/metadata/properties" xmlns:ns2="0931f5f7-8e4d-4a45-a9a6-891693687166" xmlns:ns3="ea0113d3-9d6b-407b-8175-bd70f3cf5591" targetNamespace="http://schemas.microsoft.com/office/2006/metadata/properties" ma:root="true" ma:fieldsID="449ed37a8757c5d6b7757d0e4c8f3a2b" ns2:_="" ns3:_="">
     <xsd:import namespace="0931f5f7-8e4d-4a45-a9a6-891693687166"/>
@@ -10016,6 +9970,12 @@
 </ct:contentTypeSchema>
 </file>
 
+<file path=customXml/item2.xml><?xml version="1.0" encoding="utf-8"?>
+<p:properties xmlns:p="http://schemas.microsoft.com/office/2006/metadata/properties" xmlns:xsi="http://www.w3.org/2001/XMLSchema-instance" xmlns:pc="http://schemas.microsoft.com/office/infopath/2007/PartnerControls">
+  <documentManagement/>
+</p:properties>
+</file>
+
 <file path=customXml/item3.xml><?xml version="1.0" encoding="utf-8"?>
 <?mso-contentType ?>
 <FormTemplates xmlns="http://schemas.microsoft.com/sharepoint/v3/contenttype/forms">
@@ -10026,15 +9986,6 @@
 </file>
 
 <file path=customXml/itemProps1.xml><?xml version="1.0" encoding="utf-8"?>
-<ds:datastoreItem xmlns:ds="http://schemas.openxmlformats.org/officeDocument/2006/customXml" ds:itemID="{C728879B-660B-4583-928D-55E828E68493}">
-  <ds:schemaRefs>
-    <ds:schemaRef ds:uri="http://schemas.microsoft.com/office/2006/metadata/properties"/>
-    <ds:schemaRef ds:uri="http://schemas.microsoft.com/office/infopath/2007/PartnerControls"/>
-  </ds:schemaRefs>
-</ds:datastoreItem>
-</file>
-
-<file path=customXml/itemProps2.xml><?xml version="1.0" encoding="utf-8"?>
 <ds:datastoreItem xmlns:ds="http://schemas.openxmlformats.org/officeDocument/2006/customXml" ds:itemID="{DF1A254C-4026-4073-B28E-6230090BFEFF}">
   <ds:schemaRefs>
     <ds:schemaRef ds:uri="http://schemas.microsoft.com/office/2006/metadata/contentType"/>
@@ -10053,6 +10004,15 @@
 </ds:datastoreItem>
 </file>
 
+<file path=customXml/itemProps2.xml><?xml version="1.0" encoding="utf-8"?>
+<ds:datastoreItem xmlns:ds="http://schemas.openxmlformats.org/officeDocument/2006/customXml" ds:itemID="{C728879B-660B-4583-928D-55E828E68493}">
+  <ds:schemaRefs>
+    <ds:schemaRef ds:uri="http://schemas.microsoft.com/office/2006/metadata/properties"/>
+    <ds:schemaRef ds:uri="http://schemas.microsoft.com/office/infopath/2007/PartnerControls"/>
+  </ds:schemaRefs>
+</ds:datastoreItem>
+</file>
+
 <file path=customXml/itemProps3.xml><?xml version="1.0" encoding="utf-8"?>
 <ds:datastoreItem xmlns:ds="http://schemas.openxmlformats.org/officeDocument/2006/customXml" ds:itemID="{950F9D87-7CA7-4A94-A5E5-A374AFD83891}">
   <ds:schemaRefs>

</xml_diff>